<commit_message>
small fixes to intro slides. Added graphs homework
</commit_message>
<xml_diff>
--- a/slides/courseintroduction.pptx
+++ b/slides/courseintroduction.pptx
@@ -1314,7 +1314,7 @@
             <a:fld id="{E4886CB5-510A-4EF6-9466-BC7A8F0DDE87}" type="datetime1">
               <a:rPr lang="en-US" smtClean="0"/>
               <a:pPr/>
-              <a:t>1/7/20</a:t>
+              <a:t>1/13/20</a:t>
             </a:fld>
             <a:endParaRPr lang="en-US"/>
           </a:p>
@@ -1674,7 +1674,7 @@
             <a:fld id="{9B297853-24B4-4D05-83E4-0AD2E86C55E5}" type="datetime1">
               <a:rPr lang="en-US" smtClean="0"/>
               <a:pPr/>
-              <a:t>1/7/20</a:t>
+              <a:t>1/13/20</a:t>
             </a:fld>
             <a:endParaRPr lang="en-US"/>
           </a:p>
@@ -1850,7 +1850,7 @@
             <a:fld id="{01FCDD9E-5768-4705-9537-0C020B1BB310}" type="datetime1">
               <a:rPr lang="en-US" smtClean="0"/>
               <a:pPr/>
-              <a:t>1/7/20</a:t>
+              <a:t>1/13/20</a:t>
             </a:fld>
             <a:endParaRPr lang="en-US"/>
           </a:p>
@@ -2086,7 +2086,7 @@
             <a:fld id="{4257C27E-59C2-41CA-9776-94955CBEE440}" type="datetime1">
               <a:rPr lang="en-US" smtClean="0"/>
               <a:pPr/>
-              <a:t>1/7/20</a:t>
+              <a:t>1/13/20</a:t>
             </a:fld>
             <a:endParaRPr lang="en-US"/>
           </a:p>
@@ -2372,7 +2372,7 @@
             <a:fld id="{03180747-A137-49C6-9C74-AB7EE86F4904}" type="datetime1">
               <a:rPr lang="en-US" smtClean="0"/>
               <a:pPr/>
-              <a:t>1/7/20</a:t>
+              <a:t>1/13/20</a:t>
             </a:fld>
             <a:endParaRPr lang="en-US"/>
           </a:p>
@@ -2593,7 +2593,7 @@
             <a:fld id="{EBBA31D9-ADC1-480D-86A8-1EAFB6A86A35}" type="datetime1">
               <a:rPr lang="en-US" smtClean="0"/>
               <a:pPr/>
-              <a:t>1/7/20</a:t>
+              <a:t>1/13/20</a:t>
             </a:fld>
             <a:endParaRPr lang="en-US"/>
           </a:p>
@@ -2946,7 +2946,7 @@
             <a:fld id="{80AAE9AE-3B2F-4DEA-8C41-BDDF4CDF6F40}" type="datetime1">
               <a:rPr lang="en-US" smtClean="0"/>
               <a:pPr/>
-              <a:t>1/7/20</a:t>
+              <a:t>1/13/20</a:t>
             </a:fld>
             <a:endParaRPr lang="en-US"/>
           </a:p>
@@ -3179,7 +3179,7 @@
             <a:fld id="{48252F7F-E8FE-413B-8521-D4ED924C6DE5}" type="datetime1">
               <a:rPr lang="en-US" smtClean="0"/>
               <a:pPr/>
-              <a:t>1/7/20</a:t>
+              <a:t>1/13/20</a:t>
             </a:fld>
             <a:endParaRPr lang="en-US"/>
           </a:p>
@@ -3321,7 +3321,7 @@
             <a:fld id="{2FF1B124-70E3-4E4A-90E2-6B55DB7659B3}" type="datetime1">
               <a:rPr lang="en-US" smtClean="0"/>
               <a:pPr/>
-              <a:t>1/7/20</a:t>
+              <a:t>1/13/20</a:t>
             </a:fld>
             <a:endParaRPr lang="en-US"/>
           </a:p>
@@ -3599,7 +3599,7 @@
             <a:fld id="{4EBF4C98-3CD6-4C87-BD40-5718C2628835}" type="datetime1">
               <a:rPr lang="en-US" smtClean="0"/>
               <a:pPr/>
-              <a:t>1/7/20</a:t>
+              <a:t>1/13/20</a:t>
             </a:fld>
             <a:endParaRPr lang="en-US"/>
           </a:p>
@@ -4007,7 +4007,7 @@
             <a:fld id="{6D6408A8-6B1B-4CDA-875E-7BEECDBA31DF}" type="datetime1">
               <a:rPr lang="en-US" smtClean="0"/>
               <a:pPr/>
-              <a:t>1/7/20</a:t>
+              <a:t>1/13/20</a:t>
             </a:fld>
             <a:endParaRPr lang="en-US"/>
           </a:p>
@@ -4345,7 +4345,7 @@
             <a:fld id="{C55AAF07-D2F5-4B3C-B443-40DE8C337A77}" type="datetime1">
               <a:rPr lang="en-US" smtClean="0"/>
               <a:pPr/>
-              <a:t>1/7/20</a:t>
+              <a:t>1/13/20</a:t>
             </a:fld>
             <a:endParaRPr lang="en-US"/>
           </a:p>
@@ -6235,15 +6235,7 @@
           <a:p>
             <a:r>
               <a:rPr lang="en-US" dirty="0"/>
-              <a:t>If you pass, your grade </a:t>
-            </a:r>
-            <a:r>
-              <a:rPr lang="en-US" dirty="0" err="1"/>
-              <a:t>rised</a:t>
-            </a:r>
-            <a:r>
-              <a:rPr lang="en-US" dirty="0"/>
-              <a:t> by one half-letter grade</a:t>
+              <a:t>If you pass, your grade rises by one half-letter grade</a:t>
             </a:r>
           </a:p>
           <a:p>
@@ -12748,14 +12740,7 @@
             <a:pPr lvl="1"/>
             <a:r>
               <a:rPr lang="en-US" dirty="0"/>
-              <a:t>Graphs – Basic</a:t>
-            </a:r>
-          </a:p>
-          <a:p>
-            <a:pPr lvl="1"/>
-            <a:r>
-              <a:rPr lang="en-US" dirty="0"/>
-              <a:t>Graphs – Advanced</a:t>
+              <a:t>Graphs (2)*</a:t>
             </a:r>
           </a:p>
           <a:p>

</xml_diff>

<commit_message>
slight change to grading policy
</commit_message>
<xml_diff>
--- a/slides/courseintroduction.pptx
+++ b/slides/courseintroduction.pptx
@@ -1314,7 +1314,7 @@
             <a:fld id="{E4886CB5-510A-4EF6-9466-BC7A8F0DDE87}" type="datetime1">
               <a:rPr lang="en-US" smtClean="0"/>
               <a:pPr/>
-              <a:t>1/13/20</a:t>
+              <a:t>1/15/20</a:t>
             </a:fld>
             <a:endParaRPr lang="en-US"/>
           </a:p>
@@ -1674,7 +1674,7 @@
             <a:fld id="{9B297853-24B4-4D05-83E4-0AD2E86C55E5}" type="datetime1">
               <a:rPr lang="en-US" smtClean="0"/>
               <a:pPr/>
-              <a:t>1/13/20</a:t>
+              <a:t>1/15/20</a:t>
             </a:fld>
             <a:endParaRPr lang="en-US"/>
           </a:p>
@@ -1850,7 +1850,7 @@
             <a:fld id="{01FCDD9E-5768-4705-9537-0C020B1BB310}" type="datetime1">
               <a:rPr lang="en-US" smtClean="0"/>
               <a:pPr/>
-              <a:t>1/13/20</a:t>
+              <a:t>1/15/20</a:t>
             </a:fld>
             <a:endParaRPr lang="en-US"/>
           </a:p>
@@ -2086,7 +2086,7 @@
             <a:fld id="{4257C27E-59C2-41CA-9776-94955CBEE440}" type="datetime1">
               <a:rPr lang="en-US" smtClean="0"/>
               <a:pPr/>
-              <a:t>1/13/20</a:t>
+              <a:t>1/15/20</a:t>
             </a:fld>
             <a:endParaRPr lang="en-US"/>
           </a:p>
@@ -2372,7 +2372,7 @@
             <a:fld id="{03180747-A137-49C6-9C74-AB7EE86F4904}" type="datetime1">
               <a:rPr lang="en-US" smtClean="0"/>
               <a:pPr/>
-              <a:t>1/13/20</a:t>
+              <a:t>1/15/20</a:t>
             </a:fld>
             <a:endParaRPr lang="en-US"/>
           </a:p>
@@ -2593,7 +2593,7 @@
             <a:fld id="{EBBA31D9-ADC1-480D-86A8-1EAFB6A86A35}" type="datetime1">
               <a:rPr lang="en-US" smtClean="0"/>
               <a:pPr/>
-              <a:t>1/13/20</a:t>
+              <a:t>1/15/20</a:t>
             </a:fld>
             <a:endParaRPr lang="en-US"/>
           </a:p>
@@ -2946,7 +2946,7 @@
             <a:fld id="{80AAE9AE-3B2F-4DEA-8C41-BDDF4CDF6F40}" type="datetime1">
               <a:rPr lang="en-US" smtClean="0"/>
               <a:pPr/>
-              <a:t>1/13/20</a:t>
+              <a:t>1/15/20</a:t>
             </a:fld>
             <a:endParaRPr lang="en-US"/>
           </a:p>
@@ -3179,7 +3179,7 @@
             <a:fld id="{48252F7F-E8FE-413B-8521-D4ED924C6DE5}" type="datetime1">
               <a:rPr lang="en-US" smtClean="0"/>
               <a:pPr/>
-              <a:t>1/13/20</a:t>
+              <a:t>1/15/20</a:t>
             </a:fld>
             <a:endParaRPr lang="en-US"/>
           </a:p>
@@ -3321,7 +3321,7 @@
             <a:fld id="{2FF1B124-70E3-4E4A-90E2-6B55DB7659B3}" type="datetime1">
               <a:rPr lang="en-US" smtClean="0"/>
               <a:pPr/>
-              <a:t>1/13/20</a:t>
+              <a:t>1/15/20</a:t>
             </a:fld>
             <a:endParaRPr lang="en-US"/>
           </a:p>
@@ -3599,7 +3599,7 @@
             <a:fld id="{4EBF4C98-3CD6-4C87-BD40-5718C2628835}" type="datetime1">
               <a:rPr lang="en-US" smtClean="0"/>
               <a:pPr/>
-              <a:t>1/13/20</a:t>
+              <a:t>1/15/20</a:t>
             </a:fld>
             <a:endParaRPr lang="en-US"/>
           </a:p>
@@ -4007,7 +4007,7 @@
             <a:fld id="{6D6408A8-6B1B-4CDA-875E-7BEECDBA31DF}" type="datetime1">
               <a:rPr lang="en-US" smtClean="0"/>
               <a:pPr/>
-              <a:t>1/13/20</a:t>
+              <a:t>1/15/20</a:t>
             </a:fld>
             <a:endParaRPr lang="en-US"/>
           </a:p>
@@ -4345,7 +4345,7 @@
             <a:fld id="{C55AAF07-D2F5-4B3C-B443-40DE8C337A77}" type="datetime1">
               <a:rPr lang="en-US" smtClean="0"/>
               <a:pPr/>
-              <a:t>1/13/20</a:t>
+              <a:t>1/15/20</a:t>
             </a:fld>
             <a:endParaRPr lang="en-US"/>
           </a:p>
@@ -6357,10 +6357,10 @@
       </p:sp>
       <p:pic>
         <p:nvPicPr>
-          <p:cNvPr id="6" name="Content Placeholder 5">
+          <p:cNvPr id="7" name="Content Placeholder 6">
             <a:extLst>
               <a:ext uri="{FF2B5EF4-FFF2-40B4-BE49-F238E27FC236}">
-                <a16:creationId xmlns:a16="http://schemas.microsoft.com/office/drawing/2014/main" id="{4ADF54F5-F1F7-F549-A09E-4078CA0140B1}"/>
+                <a16:creationId xmlns:a16="http://schemas.microsoft.com/office/drawing/2014/main" id="{1BD5918D-3282-D343-836C-9E049BC08B8C}"/>
               </a:ext>
             </a:extLst>
           </p:cNvPr>
@@ -6379,8 +6379,8 @@
         </p:blipFill>
         <p:spPr>
           <a:xfrm>
-            <a:off x="76200" y="1600200"/>
-            <a:ext cx="9026591" cy="4343400"/>
+            <a:off x="49079" y="1600200"/>
+            <a:ext cx="9094921" cy="4070350"/>
           </a:xfrm>
         </p:spPr>
       </p:pic>

</xml_diff>

<commit_message>
small changes to intro slides
</commit_message>
<xml_diff>
--- a/slides/courseintroduction.pptx
+++ b/slides/courseintroduction.pptx
@@ -1598,7 +1598,7 @@
             <a:fld id="{E4886CB5-510A-4EF6-9466-BC7A8F0DDE87}" type="datetime1">
               <a:rPr lang="en-US" smtClean="0"/>
               <a:pPr/>
-              <a:t>8/21/22</a:t>
+              <a:t>8/24/22</a:t>
             </a:fld>
             <a:endParaRPr lang="en-US"/>
           </a:p>
@@ -1935,7 +1935,7 @@
             <a:fld id="{9B297853-24B4-4D05-83E4-0AD2E86C55E5}" type="datetime1">
               <a:rPr lang="en-US" smtClean="0"/>
               <a:pPr/>
-              <a:t>8/21/22</a:t>
+              <a:t>8/24/22</a:t>
             </a:fld>
             <a:endParaRPr lang="en-US"/>
           </a:p>
@@ -2240,7 +2240,7 @@
             <a:fld id="{01FCDD9E-5768-4705-9537-0C020B1BB310}" type="datetime1">
               <a:rPr lang="en-US" smtClean="0"/>
               <a:pPr/>
-              <a:t>8/21/22</a:t>
+              <a:t>8/24/22</a:t>
             </a:fld>
             <a:endParaRPr lang="en-US"/>
           </a:p>
@@ -2490,7 +2490,7 @@
             <a:fld id="{4257C27E-59C2-41CA-9776-94955CBEE440}" type="datetime1">
               <a:rPr lang="en-US" smtClean="0"/>
               <a:pPr/>
-              <a:t>8/21/22</a:t>
+              <a:t>8/24/22</a:t>
             </a:fld>
             <a:endParaRPr lang="en-US"/>
           </a:p>
@@ -2900,7 +2900,7 @@
             <a:fld id="{03180747-A137-49C6-9C74-AB7EE86F4904}" type="datetime1">
               <a:rPr lang="en-US" smtClean="0"/>
               <a:pPr/>
-              <a:t>8/21/22</a:t>
+              <a:t>8/24/22</a:t>
             </a:fld>
             <a:endParaRPr lang="en-US"/>
           </a:p>
@@ -3217,7 +3217,7 @@
             <a:fld id="{EBBA31D9-ADC1-480D-86A8-1EAFB6A86A35}" type="datetime1">
               <a:rPr lang="en-US" smtClean="0"/>
               <a:pPr/>
-              <a:t>8/21/22</a:t>
+              <a:t>8/24/22</a:t>
             </a:fld>
             <a:endParaRPr lang="en-US"/>
           </a:p>
@@ -3764,7 +3764,7 @@
             <a:fld id="{80AAE9AE-3B2F-4DEA-8C41-BDDF4CDF6F40}" type="datetime1">
               <a:rPr lang="en-US" smtClean="0"/>
               <a:pPr/>
-              <a:t>8/21/22</a:t>
+              <a:t>8/24/22</a:t>
             </a:fld>
             <a:endParaRPr lang="en-US"/>
           </a:p>
@@ -3962,7 +3962,7 @@
             <a:fld id="{48252F7F-E8FE-413B-8521-D4ED924C6DE5}" type="datetime1">
               <a:rPr lang="en-US" smtClean="0"/>
               <a:pPr/>
-              <a:t>8/21/22</a:t>
+              <a:t>8/24/22</a:t>
             </a:fld>
             <a:endParaRPr lang="en-US"/>
           </a:p>
@@ -4178,7 +4178,7 @@
             <a:fld id="{2FF1B124-70E3-4E4A-90E2-6B55DB7659B3}" type="datetime1">
               <a:rPr lang="en-US" smtClean="0"/>
               <a:pPr/>
-              <a:t>8/21/22</a:t>
+              <a:t>8/24/22</a:t>
             </a:fld>
             <a:endParaRPr lang="en-US"/>
           </a:p>
@@ -4550,7 +4550,7 @@
             <a:fld id="{4EBF4C98-3CD6-4C87-BD40-5718C2628835}" type="datetime1">
               <a:rPr lang="en-US" smtClean="0"/>
               <a:pPr/>
-              <a:t>8/21/22</a:t>
+              <a:t>8/24/22</a:t>
             </a:fld>
             <a:endParaRPr lang="en-US"/>
           </a:p>
@@ -4956,7 +4956,7 @@
             <a:fld id="{6D6408A8-6B1B-4CDA-875E-7BEECDBA31DF}" type="datetime1">
               <a:rPr lang="en-US" smtClean="0"/>
               <a:pPr/>
-              <a:t>8/21/22</a:t>
+              <a:t>8/24/22</a:t>
             </a:fld>
             <a:endParaRPr lang="en-US"/>
           </a:p>
@@ -5297,7 +5297,7 @@
             <a:fld id="{C55AAF07-D2F5-4B3C-B443-40DE8C337A77}" type="datetime1">
               <a:rPr lang="en-US" smtClean="0"/>
               <a:pPr/>
-              <a:t>8/21/22</a:t>
+              <a:t>8/24/22</a:t>
             </a:fld>
             <a:endParaRPr lang="en-US"/>
           </a:p>
@@ -6284,11 +6284,11 @@
             </a:r>
             <a:r>
               <a:rPr lang="en-US" b="1" i="1" u="sng" dirty="0"/>
-              <a:t>“real” room is under reno</a:t>
-            </a:r>
-            <a:r>
-              <a:rPr lang="en-US" dirty="0"/>
-              <a:t>vation, and we will move there once it is done.</a:t>
+              <a:t>“real” room is under renovation</a:t>
+            </a:r>
+            <a:r>
+              <a:rPr lang="en-US" dirty="0"/>
+              <a:t>, and we will move there once it is done.</a:t>
             </a:r>
           </a:p>
           <a:p>
@@ -6777,7 +6777,7 @@
             <a:pPr lvl="1"/>
             <a:r>
               <a:rPr lang="en-US" sz="2000" dirty="0"/>
-              <a:t>Final Exam		Mod 1-10 (final attempts)</a:t>
+              <a:t>Final Exam			Mod 1-10 (final attempts)</a:t>
             </a:r>
           </a:p>
           <a:p>
@@ -6790,7 +6790,7 @@
             </a:pPr>
             <a:r>
               <a:rPr lang="en-US" dirty="0"/>
-              <a:t>Note: it’s naturally harder to do a lot of quizzes in a 75-minute class period, so don’t get yourself into a bad situation!</a:t>
+              <a:t>Note: it’s naturally harder to do a lot of quizzes in a 50-minute class period, so don’t get yourself into a bad situation!</a:t>
             </a:r>
           </a:p>
         </p:txBody>
@@ -7426,7 +7426,7 @@
         </p:spPr>
         <p:txBody>
           <a:bodyPr>
-            <a:normAutofit fontScale="92500" lnSpcReduction="20000"/>
+            <a:normAutofit/>
           </a:bodyPr>
           <a:lstStyle/>
           <a:p>
@@ -7472,14 +7472,7 @@
             <a:pPr lvl="1" algn="l"/>
             <a:r>
               <a:rPr lang="en-US" dirty="0"/>
-              <a:t>Some will be graded solely on passing test-cases and/or meeting  a target runtime.</a:t>
-            </a:r>
-          </a:p>
-          <a:p>
-            <a:pPr lvl="1" algn="l"/>
-            <a:r>
-              <a:rPr lang="en-US" dirty="0"/>
-              <a:t>Some will require you to measure run-times and answer questions. </a:t>
+              <a:t>Will be graded solely on passing test-cases and/or meeting  a target runtime. </a:t>
             </a:r>
           </a:p>
           <a:p>
@@ -7604,7 +7597,7 @@
         </p:nvSpPr>
         <p:spPr>
           <a:xfrm>
-            <a:off x="1524000" y="1874856"/>
+            <a:off x="1524000" y="2103456"/>
             <a:ext cx="9046139" cy="4373544"/>
           </a:xfrm>
         </p:spPr>
@@ -7642,7 +7635,11 @@
             </a:r>
             <a:r>
               <a:rPr lang="en-US" dirty="0"/>
-              <a:t>: The student has shown evidence that they have attempted the ENTIRE assignment and made a serious, thoughtful attempt at it.</a:t>
+              <a:t>: The student has shown evidence that they have attempted the ENTIRE assignment and made a serious, thoughtful attempt at it. </a:t>
+            </a:r>
+            <a:r>
+              <a:rPr lang="en-US" i="1" u="sng" dirty="0"/>
+              <a:t>**Grade would be &gt;= 80% if graded in a traditional manner.</a:t>
             </a:r>
           </a:p>
           <a:p>
@@ -8601,7 +8598,7 @@
             <a:pPr lvl="1"/>
             <a:r>
               <a:rPr lang="en-US" dirty="0"/>
-              <a:t>We care about breadth over depth until you reach 9 modules passed to earn a B</a:t>
+              <a:t>We care about breadth over depth until you reach 8 modules passed to earn a B-</a:t>
             </a:r>
           </a:p>
           <a:p>
@@ -8621,13 +8618,7 @@
           <a:p>
             <a:r>
               <a:rPr lang="en-US" dirty="0"/>
-              <a:t>After B obtained, high-passes are needed to earn, B+, A-, etc.</a:t>
-            </a:r>
-          </a:p>
-          <a:p>
-            <a:r>
-              <a:rPr lang="en-US" dirty="0"/>
-              <a:t>We are treating the course as having 9 modules (for B) instead of 10, effectively allowing you to “skip one module”</a:t>
+              <a:t>After B- obtained, high-passes are needed to earn B, B+, A-, etc.</a:t>
             </a:r>
           </a:p>
         </p:txBody>
@@ -16620,7 +16611,12 @@
             </p:custDataLst>
           </p:nvPr>
         </p:nvSpPr>
-        <p:spPr/>
+        <p:spPr>
+          <a:xfrm>
+            <a:off x="1828800" y="1567652"/>
+            <a:ext cx="8741339" cy="4482292"/>
+          </a:xfrm>
+        </p:spPr>
         <p:txBody>
           <a:bodyPr/>
           <a:lstStyle/>

</xml_diff>